<commit_message>
Updates to slides for intro to TLS
</commit_message>
<xml_diff>
--- a/2020sp_cs316s/lectures/13 TLS and TLS MITM.pptx
+++ b/2020sp_cs316s/lectures/13 TLS and TLS MITM.pptx
@@ -7461,7 +7461,7 @@
 <dgm:dataModel xmlns:dgm="http://schemas.openxmlformats.org/drawingml/2006/diagram" xmlns:a="http://schemas.openxmlformats.org/drawingml/2006/main">
   <dgm:ptLst>
     <dgm:pt modelId="{514B695F-2A87-484E-8E09-48ACE810809C}" type="doc">
-      <dgm:prSet loTypeId="urn:microsoft.com/office/officeart/2005/8/layout/hierarchy1" loCatId="hierarchy" qsTypeId="urn:microsoft.com/office/officeart/2005/8/quickstyle/simple1" qsCatId="simple" csTypeId="urn:microsoft.com/office/officeart/2005/8/colors/colorful2" csCatId="colorful"/>
+      <dgm:prSet loTypeId="urn:microsoft.com/office/officeart/2005/8/layout/hierarchy1" loCatId="hierarchy" qsTypeId="urn:microsoft.com/office/officeart/2005/8/quickstyle/simple1" qsCatId="simple" csTypeId="urn:microsoft.com/office/officeart/2005/8/colors/colorful2" csCatId="colorful" phldr="1"/>
       <dgm:spPr/>
       <dgm:t>
         <a:bodyPr/>
@@ -7551,8 +7551,8 @@
         <a:lstStyle/>
         <a:p>
           <a:r>
-            <a:rPr lang="en-US"/>
-            <a:t>Can provide confidentiality, but generally not integrity</a:t>
+            <a:rPr lang="en-US" dirty="0"/>
+            <a:t>Can provide confidentiality, but generally not Entity Authentication</a:t>
           </a:r>
         </a:p>
       </dgm:t>
@@ -10315,12 +10315,12 @@
         <a:fontRef idx="minor"/>
       </dsp:style>
       <dsp:txBody>
-        <a:bodyPr spcFirstLastPara="0" vert="horz" wrap="square" lIns="106680" tIns="106680" rIns="106680" bIns="106680" numCol="1" spcCol="1270" anchor="ctr" anchorCtr="0">
+        <a:bodyPr spcFirstLastPara="0" vert="horz" wrap="square" lIns="95250" tIns="95250" rIns="95250" bIns="95250" numCol="1" spcCol="1270" anchor="ctr" anchorCtr="0">
           <a:noAutofit/>
         </a:bodyPr>
         <a:lstStyle/>
         <a:p>
-          <a:pPr marL="0" lvl="0" indent="0" algn="ctr" defTabSz="1244600">
+          <a:pPr marL="0" lvl="0" indent="0" algn="ctr" defTabSz="1111250">
             <a:lnSpc>
               <a:spcPct val="90000"/>
             </a:lnSpc>
@@ -10333,7 +10333,7 @@
             <a:buNone/>
           </a:pPr>
           <a:r>
-            <a:rPr lang="en-US" sz="2800" kern="1200"/>
+            <a:rPr lang="en-US" sz="2500" kern="1200"/>
             <a:t>One key both encrypts and decrypts data</a:t>
           </a:r>
         </a:p>
@@ -10444,12 +10444,12 @@
         <a:fontRef idx="minor"/>
       </dsp:style>
       <dsp:txBody>
-        <a:bodyPr spcFirstLastPara="0" vert="horz" wrap="square" lIns="106680" tIns="106680" rIns="106680" bIns="106680" numCol="1" spcCol="1270" anchor="ctr" anchorCtr="0">
+        <a:bodyPr spcFirstLastPara="0" vert="horz" wrap="square" lIns="95250" tIns="95250" rIns="95250" bIns="95250" numCol="1" spcCol="1270" anchor="ctr" anchorCtr="0">
           <a:noAutofit/>
         </a:bodyPr>
         <a:lstStyle/>
         <a:p>
-          <a:pPr marL="0" lvl="0" indent="0" algn="ctr" defTabSz="1244600">
+          <a:pPr marL="0" lvl="0" indent="0" algn="ctr" defTabSz="1111250">
             <a:lnSpc>
               <a:spcPct val="90000"/>
             </a:lnSpc>
@@ -10462,7 +10462,7 @@
             <a:buNone/>
           </a:pPr>
           <a:r>
-            <a:rPr lang="en-US" sz="2800" kern="1200"/>
+            <a:rPr lang="en-US" sz="2500" kern="1200"/>
             <a:t>Typically fast and useful for bulk encryption</a:t>
           </a:r>
         </a:p>
@@ -10573,12 +10573,12 @@
         <a:fontRef idx="minor"/>
       </dsp:style>
       <dsp:txBody>
-        <a:bodyPr spcFirstLastPara="0" vert="horz" wrap="square" lIns="106680" tIns="106680" rIns="106680" bIns="106680" numCol="1" spcCol="1270" anchor="ctr" anchorCtr="0">
+        <a:bodyPr spcFirstLastPara="0" vert="horz" wrap="square" lIns="95250" tIns="95250" rIns="95250" bIns="95250" numCol="1" spcCol="1270" anchor="ctr" anchorCtr="0">
           <a:noAutofit/>
         </a:bodyPr>
         <a:lstStyle/>
         <a:p>
-          <a:pPr marL="0" lvl="0" indent="0" algn="ctr" defTabSz="1244600">
+          <a:pPr marL="0" lvl="0" indent="0" algn="ctr" defTabSz="1111250">
             <a:lnSpc>
               <a:spcPct val="90000"/>
             </a:lnSpc>
@@ -10591,8 +10591,8 @@
             <a:buNone/>
           </a:pPr>
           <a:r>
-            <a:rPr lang="en-US" sz="2800" kern="1200"/>
-            <a:t>Can provide confidentiality, but generally not integrity</a:t>
+            <a:rPr lang="en-US" sz="2500" kern="1200" dirty="0"/>
+            <a:t>Can provide confidentiality, but generally not Entity Authentication</a:t>
           </a:r>
         </a:p>
       </dsp:txBody>
@@ -27413,8 +27413,13 @@
           <a:p>
             <a:r>
               <a:rPr lang="en-US" dirty="0"/>
-              <a:t>TLS and TLS MITM</a:t>
+              <a:t>Intro </a:t>
             </a:r>
+            <a:r>
+              <a:rPr lang="en-US"/>
+              <a:t>to Crypto and TLS</a:t>
+            </a:r>
+            <a:endParaRPr lang="en-US" dirty="0"/>
           </a:p>
         </p:txBody>
       </p:sp>
@@ -28989,7 +28994,7 @@
           <a:p>
             <a:r>
               <a:rPr lang="en-US" dirty="0"/>
-              <a:t>Key agreement is where parties create a session key between them</a:t>
+              <a:t>Key exchange is where parties create a session key between them</a:t>
             </a:r>
           </a:p>
           <a:p>
@@ -29001,7 +29006,7 @@
           <a:p>
             <a:r>
               <a:rPr lang="en-US" dirty="0"/>
-              <a:t>Key Exchange uses public key computations to COMPUTE a shared key</a:t>
+              <a:t>Key Agreement uses public key computations to COMPUTE a shared key</a:t>
             </a:r>
           </a:p>
         </p:txBody>
@@ -34102,7 +34107,7 @@
             <p:ph idx="1"/>
             <p:extLst>
               <p:ext uri="{D42A27DB-BD31-4B8C-83A1-F6EECF244321}">
-                <p14:modId xmlns:p14="http://schemas.microsoft.com/office/powerpoint/2010/main" val="1214033356"/>
+                <p14:modId xmlns:p14="http://schemas.microsoft.com/office/powerpoint/2010/main" val="2052517089"/>
               </p:ext>
             </p:extLst>
           </p:nvPr>

</xml_diff>